<commit_message>
Last minute changes before the class
</commit_message>
<xml_diff>
--- a/FL-P3-ML-2018-07-14.pptx
+++ b/FL-P3-ML-2018-07-14.pptx
@@ -9,7 +9,8 @@
     <p:sldId id="257" r:id="rId3"/>
     <p:sldId id="258" r:id="rId4"/>
     <p:sldId id="259" r:id="rId5"/>
-    <p:sldId id="261" r:id="rId6"/>
+    <p:sldId id="262" r:id="rId6"/>
+    <p:sldId id="261" r:id="rId7"/>
   </p:sldIdLst>
   <p:sldSz cx="12192000" cy="6858000"/>
   <p:notesSz cx="6858000" cy="9144000"/>
@@ -108,6 +109,11 @@
       </a:defRPr>
     </a:lvl9pPr>
   </p:defaultTextStyle>
+  <p:extLst>
+    <p:ext uri="{EFAFB233-063F-42B5-8137-9DF3F51BA10A}">
+      <p15:sldGuideLst xmlns:p15="http://schemas.microsoft.com/office/powerpoint/2012/main"/>
+    </p:ext>
+  </p:extLst>
 </p:presentation>
 </file>
 
@@ -282,7 +288,7 @@
           <a:p>
             <a:fld id="{48A87A34-81AB-432B-8DAE-1953F412C126}" type="datetimeFigureOut">
               <a:rPr lang="en-US" dirty="0"/>
-              <a:t>7/14/18</a:t>
+              <a:t>7/16/18</a:t>
             </a:fld>
             <a:endParaRPr lang="en-US" dirty="0"/>
           </a:p>
@@ -589,7 +595,7 @@
           <a:p>
             <a:fld id="{48A87A34-81AB-432B-8DAE-1953F412C126}" type="datetimeFigureOut">
               <a:rPr lang="en-US" dirty="0"/>
-              <a:t>7/14/18</a:t>
+              <a:t>7/16/18</a:t>
             </a:fld>
             <a:endParaRPr lang="en-US" dirty="0"/>
           </a:p>
@@ -806,7 +812,7 @@
           <a:p>
             <a:fld id="{48A87A34-81AB-432B-8DAE-1953F412C126}" type="datetimeFigureOut">
               <a:rPr lang="en-US" dirty="0"/>
-              <a:t>7/14/18</a:t>
+              <a:t>7/16/18</a:t>
             </a:fld>
             <a:endParaRPr lang="en-US" dirty="0"/>
           </a:p>
@@ -1092,7 +1098,7 @@
           <a:p>
             <a:fld id="{48A87A34-81AB-432B-8DAE-1953F412C126}" type="datetimeFigureOut">
               <a:rPr lang="en-US" dirty="0"/>
-              <a:t>7/14/18</a:t>
+              <a:t>7/16/18</a:t>
             </a:fld>
             <a:endParaRPr lang="en-US" dirty="0"/>
           </a:p>
@@ -1541,7 +1547,7 @@
           <a:p>
             <a:fld id="{48A87A34-81AB-432B-8DAE-1953F412C126}" type="datetimeFigureOut">
               <a:rPr lang="en-US" dirty="0"/>
-              <a:t>7/14/18</a:t>
+              <a:t>7/16/18</a:t>
             </a:fld>
             <a:endParaRPr lang="en-US" dirty="0"/>
           </a:p>
@@ -2112,7 +2118,7 @@
           <a:p>
             <a:fld id="{48A87A34-81AB-432B-8DAE-1953F412C126}" type="datetimeFigureOut">
               <a:rPr lang="en-US" dirty="0"/>
-              <a:t>7/14/18</a:t>
+              <a:t>7/16/18</a:t>
             </a:fld>
             <a:endParaRPr lang="en-US" dirty="0"/>
           </a:p>
@@ -2959,7 +2965,7 @@
           <a:p>
             <a:fld id="{48A87A34-81AB-432B-8DAE-1953F412C126}" type="datetimeFigureOut">
               <a:rPr lang="en-US" dirty="0"/>
-              <a:t>7/14/18</a:t>
+              <a:t>7/16/18</a:t>
             </a:fld>
             <a:endParaRPr lang="en-US" dirty="0"/>
           </a:p>
@@ -3159,7 +3165,7 @@
           <a:p>
             <a:fld id="{48A87A34-81AB-432B-8DAE-1953F412C126}" type="datetimeFigureOut">
               <a:rPr lang="en-US" dirty="0"/>
-              <a:t>7/14/18</a:t>
+              <a:t>7/16/18</a:t>
             </a:fld>
             <a:endParaRPr lang="en-US" dirty="0"/>
           </a:p>
@@ -3368,7 +3374,7 @@
           <a:p>
             <a:fld id="{48A87A34-81AB-432B-8DAE-1953F412C126}" type="datetimeFigureOut">
               <a:rPr lang="en-US" dirty="0"/>
-              <a:t>7/14/18</a:t>
+              <a:t>7/16/18</a:t>
             </a:fld>
             <a:endParaRPr lang="en-US" dirty="0"/>
           </a:p>
@@ -3568,7 +3574,7 @@
           <a:p>
             <a:fld id="{48A87A34-81AB-432B-8DAE-1953F412C126}" type="datetimeFigureOut">
               <a:rPr lang="en-US" dirty="0"/>
-              <a:t>7/14/18</a:t>
+              <a:t>7/16/18</a:t>
             </a:fld>
             <a:endParaRPr lang="en-US" dirty="0"/>
           </a:p>
@@ -3843,7 +3849,7 @@
           <a:p>
             <a:fld id="{48A87A34-81AB-432B-8DAE-1953F412C126}" type="datetimeFigureOut">
               <a:rPr lang="en-US" dirty="0"/>
-              <a:t>7/14/18</a:t>
+              <a:t>7/16/18</a:t>
             </a:fld>
             <a:endParaRPr lang="en-US" dirty="0"/>
           </a:p>
@@ -4105,7 +4111,7 @@
           <a:p>
             <a:fld id="{48A87A34-81AB-432B-8DAE-1953F412C126}" type="datetimeFigureOut">
               <a:rPr lang="en-US" dirty="0"/>
-              <a:t>7/14/18</a:t>
+              <a:t>7/16/18</a:t>
             </a:fld>
             <a:endParaRPr lang="en-US" dirty="0"/>
           </a:p>
@@ -4515,7 +4521,7 @@
           <a:p>
             <a:fld id="{48A87A34-81AB-432B-8DAE-1953F412C126}" type="datetimeFigureOut">
               <a:rPr lang="en-US" dirty="0"/>
-              <a:t>7/14/18</a:t>
+              <a:t>7/16/18</a:t>
             </a:fld>
             <a:endParaRPr lang="en-US" dirty="0"/>
           </a:p>
@@ -4658,7 +4664,7 @@
           <a:p>
             <a:fld id="{48A87A34-81AB-432B-8DAE-1953F412C126}" type="datetimeFigureOut">
               <a:rPr lang="en-US" dirty="0"/>
-              <a:t>7/14/18</a:t>
+              <a:t>7/16/18</a:t>
             </a:fld>
             <a:endParaRPr lang="en-US" dirty="0"/>
           </a:p>
@@ -4778,7 +4784,7 @@
           <a:p>
             <a:fld id="{48A87A34-81AB-432B-8DAE-1953F412C126}" type="datetimeFigureOut">
               <a:rPr lang="en-US" dirty="0"/>
-              <a:t>7/14/18</a:t>
+              <a:t>7/16/18</a:t>
             </a:fld>
             <a:endParaRPr lang="en-US" dirty="0"/>
           </a:p>
@@ -5052,7 +5058,7 @@
           <a:p>
             <a:fld id="{48A87A34-81AB-432B-8DAE-1953F412C126}" type="datetimeFigureOut">
               <a:rPr lang="en-US" dirty="0"/>
-              <a:t>7/14/18</a:t>
+              <a:t>7/16/18</a:t>
             </a:fld>
             <a:endParaRPr lang="en-US" dirty="0"/>
           </a:p>
@@ -5359,7 +5365,7 @@
           <a:p>
             <a:fld id="{48A87A34-81AB-432B-8DAE-1953F412C126}" type="datetimeFigureOut">
               <a:rPr lang="en-US" dirty="0"/>
-              <a:t>7/14/18</a:t>
+              <a:t>7/16/18</a:t>
             </a:fld>
             <a:endParaRPr lang="en-US" dirty="0"/>
           </a:p>
@@ -5608,7 +5614,7 @@
             <a:fld id="{48A87A34-81AB-432B-8DAE-1953F412C126}" type="datetimeFigureOut">
               <a:rPr lang="en-US" dirty="0"/>
               <a:pPr/>
-              <a:t>7/14/18</a:t>
+              <a:t>7/16/18</a:t>
             </a:fld>
             <a:endParaRPr lang="en-US" dirty="0"/>
           </a:p>
@@ -11108,6 +11114,165 @@
           <p:cNvPr id="2" name="Title 1">
             <a:extLst>
               <a:ext uri="{FF2B5EF4-FFF2-40B4-BE49-F238E27FC236}">
+                <a16:creationId xmlns:a16="http://schemas.microsoft.com/office/drawing/2014/main" id="{C3914017-9B10-C348-9104-58A777FE3606}"/>
+              </a:ext>
+            </a:extLst>
+          </p:cNvPr>
+          <p:cNvSpPr>
+            <a:spLocks noGrp="1"/>
+          </p:cNvSpPr>
+          <p:nvPr>
+            <p:ph type="title"/>
+          </p:nvPr>
+        </p:nvSpPr>
+        <p:spPr>
+          <a:xfrm>
+            <a:off x="913775" y="618518"/>
+            <a:ext cx="10364451" cy="842638"/>
+          </a:xfrm>
+        </p:spPr>
+        <p:txBody>
+          <a:bodyPr/>
+          <a:lstStyle/>
+          <a:p>
+            <a:pPr algn="l"/>
+            <a:r>
+              <a:rPr lang="en-US" dirty="0"/>
+              <a:t>Walk forward </a:t>
+            </a:r>
+            <a:r>
+              <a:rPr lang="en-US" dirty="0" err="1"/>
+              <a:t>COde</a:t>
+            </a:r>
+            <a:endParaRPr lang="en-US" dirty="0"/>
+          </a:p>
+        </p:txBody>
+      </p:sp>
+      <p:pic>
+        <p:nvPicPr>
+          <p:cNvPr id="5" name="Picture 4">
+            <a:extLst>
+              <a:ext uri="{FF2B5EF4-FFF2-40B4-BE49-F238E27FC236}">
+                <a16:creationId xmlns:a16="http://schemas.microsoft.com/office/drawing/2014/main" id="{BEE88FC5-23AA-974F-B348-409E527658C8}"/>
+              </a:ext>
+            </a:extLst>
+          </p:cNvPr>
+          <p:cNvPicPr>
+            <a:picLocks noChangeAspect="1"/>
+          </p:cNvPicPr>
+          <p:nvPr/>
+        </p:nvPicPr>
+        <p:blipFill>
+          <a:blip r:embed="rId2"/>
+          <a:stretch>
+            <a:fillRect/>
+          </a:stretch>
+        </p:blipFill>
+        <p:spPr>
+          <a:xfrm>
+            <a:off x="6031875" y="98854"/>
+            <a:ext cx="5073147" cy="6528559"/>
+          </a:xfrm>
+          <a:prstGeom prst="rect">
+            <a:avLst/>
+          </a:prstGeom>
+        </p:spPr>
+      </p:pic>
+      <p:pic>
+        <p:nvPicPr>
+          <p:cNvPr id="7" name="Picture 6">
+            <a:extLst>
+              <a:ext uri="{FF2B5EF4-FFF2-40B4-BE49-F238E27FC236}">
+                <a16:creationId xmlns:a16="http://schemas.microsoft.com/office/drawing/2014/main" id="{AC72284E-8364-D84A-8C17-273588F4A036}"/>
+              </a:ext>
+            </a:extLst>
+          </p:cNvPr>
+          <p:cNvPicPr>
+            <a:picLocks noChangeAspect="1"/>
+          </p:cNvPicPr>
+          <p:nvPr/>
+        </p:nvPicPr>
+        <p:blipFill>
+          <a:blip r:embed="rId3"/>
+          <a:stretch>
+            <a:fillRect/>
+          </a:stretch>
+        </p:blipFill>
+        <p:spPr>
+          <a:xfrm>
+            <a:off x="908319" y="4442956"/>
+            <a:ext cx="3927780" cy="2300139"/>
+          </a:xfrm>
+          <a:prstGeom prst="rect">
+            <a:avLst/>
+          </a:prstGeom>
+        </p:spPr>
+      </p:pic>
+      <p:pic>
+        <p:nvPicPr>
+          <p:cNvPr id="4" name="Picture 3">
+            <a:extLst>
+              <a:ext uri="{FF2B5EF4-FFF2-40B4-BE49-F238E27FC236}">
+                <a16:creationId xmlns:a16="http://schemas.microsoft.com/office/drawing/2014/main" id="{4F53645F-723C-BA41-B09E-DB8A1139304A}"/>
+              </a:ext>
+            </a:extLst>
+          </p:cNvPr>
+          <p:cNvPicPr>
+            <a:picLocks noChangeAspect="1"/>
+          </p:cNvPicPr>
+          <p:nvPr/>
+        </p:nvPicPr>
+        <p:blipFill>
+          <a:blip r:embed="rId4"/>
+          <a:stretch>
+            <a:fillRect/>
+          </a:stretch>
+        </p:blipFill>
+        <p:spPr>
+          <a:xfrm>
+            <a:off x="574592" y="1211820"/>
+            <a:ext cx="4392827" cy="3113045"/>
+          </a:xfrm>
+          <a:prstGeom prst="rect">
+            <a:avLst/>
+          </a:prstGeom>
+        </p:spPr>
+      </p:pic>
+    </p:spTree>
+    <p:extLst>
+      <p:ext uri="{BB962C8B-B14F-4D97-AF65-F5344CB8AC3E}">
+        <p14:creationId xmlns:p14="http://schemas.microsoft.com/office/powerpoint/2010/main" val="4120175615"/>
+      </p:ext>
+    </p:extLst>
+  </p:cSld>
+  <p:clrMapOvr>
+    <a:masterClrMapping/>
+  </p:clrMapOvr>
+</p:sld>
+</file>
+
+<file path=ppt/slides/slide6.xml><?xml version="1.0" encoding="utf-8"?>
+<p:sld xmlns:a="http://schemas.openxmlformats.org/drawingml/2006/main" xmlns:r="http://schemas.openxmlformats.org/officeDocument/2006/relationships" xmlns:p="http://schemas.openxmlformats.org/presentationml/2006/main">
+  <p:cSld>
+    <p:spTree>
+      <p:nvGrpSpPr>
+        <p:cNvPr id="1" name=""/>
+        <p:cNvGrpSpPr/>
+        <p:nvPr/>
+      </p:nvGrpSpPr>
+      <p:grpSpPr>
+        <a:xfrm>
+          <a:off x="0" y="0"/>
+          <a:ext cx="0" cy="0"/>
+          <a:chOff x="0" y="0"/>
+          <a:chExt cx="0" cy="0"/>
+        </a:xfrm>
+      </p:grpSpPr>
+      <p:sp>
+        <p:nvSpPr>
+          <p:cNvPr id="2" name="Title 1">
+            <a:extLst>
+              <a:ext uri="{FF2B5EF4-FFF2-40B4-BE49-F238E27FC236}">
                 <a16:creationId xmlns:a16="http://schemas.microsoft.com/office/drawing/2014/main" id="{77B487F9-A67F-6849-9C14-A72E9F4012DC}"/>
               </a:ext>
             </a:extLst>

</xml_diff>